<commit_message>
ensure local changes make it to remote
</commit_message>
<xml_diff>
--- a/iteration/iteration2/CS673_presentation2_team3.pptx
+++ b/iteration/iteration2/CS673_presentation2_team3.pptx
@@ -5,7 +5,7 @@
     <p:sldMasterId id="2147483751" r:id="rId1"/>
   </p:sldMasterIdLst>
   <p:notesMasterIdLst>
-    <p:notesMasterId r:id="rId22"/>
+    <p:notesMasterId r:id="rId23"/>
   </p:notesMasterIdLst>
   <p:sldIdLst>
     <p:sldId id="256" r:id="rId2"/>
@@ -27,21 +27,22 @@
     <p:sldId id="273" r:id="rId18"/>
     <p:sldId id="274" r:id="rId19"/>
     <p:sldId id="275" r:id="rId20"/>
-    <p:sldId id="263" r:id="rId21"/>
+    <p:sldId id="276" r:id="rId21"/>
+    <p:sldId id="263" r:id="rId22"/>
   </p:sldIdLst>
   <p:sldSz cx="9144000" cy="5143500" type="screen16x9"/>
   <p:notesSz cx="6858000" cy="9144000"/>
   <p:embeddedFontLst>
     <p:embeddedFont>
       <p:font typeface="Lato" panose="020F0502020204030203" pitchFamily="34" charset="0"/>
-      <p:regular r:id="rId23"/>
-      <p:bold r:id="rId24"/>
-      <p:italic r:id="rId25"/>
-      <p:boldItalic r:id="rId26"/>
+      <p:regular r:id="rId24"/>
+      <p:bold r:id="rId25"/>
+      <p:italic r:id="rId26"/>
+      <p:boldItalic r:id="rId27"/>
     </p:embeddedFont>
     <p:embeddedFont>
       <p:font typeface="Wingdings 3" pitchFamily="2" charset="2"/>
-      <p:regular r:id="rId27"/>
+      <p:regular r:id="rId28"/>
     </p:embeddedFont>
   </p:embeddedFontLst>
   <p:defaultTextStyle>
@@ -6152,7 +6153,7 @@
           <a:p>
             <a:fld id="{9AB3A824-1A51-4B26-AD58-A6D8E14F6C04}" type="datetimeFigureOut">
               <a:rPr lang="en-US" smtClean="0"/>
-              <a:t>6/9/24</a:t>
+              <a:t>6/10/24</a:t>
             </a:fld>
             <a:endParaRPr lang="en-US" dirty="0"/>
           </a:p>
@@ -6502,7 +6503,7 @@
           <a:p>
             <a:fld id="{D857E33E-8B18-4087-B112-809917729534}" type="datetimeFigureOut">
               <a:rPr lang="en-US" smtClean="0"/>
-              <a:t>6/9/24</a:t>
+              <a:t>6/10/24</a:t>
             </a:fld>
             <a:endParaRPr lang="en-US" dirty="0"/>
           </a:p>
@@ -6820,7 +6821,7 @@
           <a:p>
             <a:fld id="{D3FFE419-2371-464F-8239-3959401C3561}" type="datetimeFigureOut">
               <a:rPr lang="en-US" smtClean="0"/>
-              <a:t>6/9/24</a:t>
+              <a:t>6/10/24</a:t>
             </a:fld>
             <a:endParaRPr lang="en-US" dirty="0"/>
           </a:p>
@@ -7450,7 +7451,7 @@
           <a:p>
             <a:fld id="{97D162C4-EDD9-4389-A98B-B87ECEA2A816}" type="datetimeFigureOut">
               <a:rPr lang="en-US" smtClean="0"/>
-              <a:t>6/9/24</a:t>
+              <a:t>6/10/24</a:t>
             </a:fld>
             <a:endParaRPr lang="en-US" dirty="0"/>
           </a:p>
@@ -7873,7 +7874,7 @@
           <a:p>
             <a:fld id="{3E5059C3-6A89-4494-99FF-5A4D6FFD50EB}" type="datetimeFigureOut">
               <a:rPr lang="en-US" smtClean="0"/>
-              <a:t>6/9/24</a:t>
+              <a:t>6/10/24</a:t>
             </a:fld>
             <a:endParaRPr lang="en-US" dirty="0"/>
           </a:p>
@@ -8203,7 +8204,7 @@
           <a:p>
             <a:fld id="{CA954B2F-12DE-47F5-8894-472B206D2E1E}" type="datetimeFigureOut">
               <a:rPr lang="en-US" smtClean="0"/>
-              <a:t>6/9/24</a:t>
+              <a:t>6/10/24</a:t>
             </a:fld>
             <a:endParaRPr lang="en-US" dirty="0"/>
           </a:p>
@@ -8763,7 +8764,7 @@
           <a:p>
             <a:fld id="{3F30E46F-7819-4ACF-B48B-48222C2ACC88}" type="datetimeFigureOut">
               <a:rPr lang="en-US" smtClean="0"/>
-              <a:t>6/9/24</a:t>
+              <a:t>6/10/24</a:t>
             </a:fld>
             <a:endParaRPr lang="en-US" dirty="0"/>
           </a:p>
@@ -8974,7 +8975,7 @@
           <a:p>
             <a:fld id="{1FAF3416-4057-4DAA-829D-4CA07428D088}" type="datetimeFigureOut">
               <a:rPr lang="en-US" smtClean="0"/>
-              <a:t>6/9/24</a:t>
+              <a:t>6/10/24</a:t>
             </a:fld>
             <a:endParaRPr lang="en-US" dirty="0"/>
           </a:p>
@@ -9203,7 +9204,7 @@
           <a:p>
             <a:fld id="{921D9284-D300-4297-87F7-E791DCC15DB1}" type="datetimeFigureOut">
               <a:rPr lang="en-US" smtClean="0"/>
-              <a:t>6/9/24</a:t>
+              <a:t>6/10/24</a:t>
             </a:fld>
             <a:endParaRPr lang="en-US" dirty="0"/>
           </a:p>
@@ -9587,7 +9588,7 @@
           <a:p>
             <a:fld id="{37D525BB-DA17-4BA0-B3C8-3AC3ABC827E6}" type="datetimeFigureOut">
               <a:rPr lang="en-US" smtClean="0"/>
-              <a:t>6/9/24</a:t>
+              <a:t>6/10/24</a:t>
             </a:fld>
             <a:endParaRPr lang="en-US" dirty="0"/>
           </a:p>
@@ -10006,7 +10007,7 @@
           <a:p>
             <a:fld id="{B16C4C9A-3960-41CF-A4E9-2A8FB932454B}" type="datetimeFigureOut">
               <a:rPr lang="en-US" smtClean="0"/>
-              <a:t>6/9/24</a:t>
+              <a:t>6/10/24</a:t>
             </a:fld>
             <a:endParaRPr lang="en-US" dirty="0"/>
           </a:p>
@@ -10333,7 +10334,7 @@
           <a:p>
             <a:fld id="{3CBC1C18-307B-4F68-A007-B5B542270E8D}" type="datetimeFigureOut">
               <a:rPr lang="en-US" smtClean="0"/>
-              <a:t>6/9/24</a:t>
+              <a:t>6/10/24</a:t>
             </a:fld>
             <a:endParaRPr lang="en-US" dirty="0"/>
           </a:p>
@@ -12948,6 +12949,85 @@
 <file path=ppt/slides/slide20.xml><?xml version="1.0" encoding="utf-8"?>
 <p:sld xmlns:a="http://schemas.openxmlformats.org/drawingml/2006/main" xmlns:r="http://schemas.openxmlformats.org/officeDocument/2006/relationships" xmlns:p="http://schemas.openxmlformats.org/presentationml/2006/main">
   <p:cSld>
+    <p:spTree>
+      <p:nvGrpSpPr>
+        <p:cNvPr id="1" name=""/>
+        <p:cNvGrpSpPr/>
+        <p:nvPr/>
+      </p:nvGrpSpPr>
+      <p:grpSpPr>
+        <a:xfrm>
+          <a:off x="0" y="0"/>
+          <a:ext cx="0" cy="0"/>
+          <a:chOff x="0" y="0"/>
+          <a:chExt cx="0" cy="0"/>
+        </a:xfrm>
+      </p:grpSpPr>
+      <p:sp>
+        <p:nvSpPr>
+          <p:cNvPr id="2" name="Title 1">
+            <a:extLst>
+              <a:ext uri="{FF2B5EF4-FFF2-40B4-BE49-F238E27FC236}">
+                <a16:creationId xmlns:a16="http://schemas.microsoft.com/office/drawing/2014/main" id="{7177B1EE-E9E1-3832-3D80-D1C7B4193E3A}"/>
+              </a:ext>
+            </a:extLst>
+          </p:cNvPr>
+          <p:cNvSpPr>
+            <a:spLocks noGrp="1"/>
+          </p:cNvSpPr>
+          <p:nvPr>
+            <p:ph type="title"/>
+          </p:nvPr>
+        </p:nvSpPr>
+        <p:spPr>
+          <a:xfrm>
+            <a:off x="-488713" y="1837018"/>
+            <a:ext cx="7688700" cy="535200"/>
+          </a:xfrm>
+        </p:spPr>
+        <p:txBody>
+          <a:bodyPr>
+            <a:noAutofit/>
+          </a:bodyPr>
+          <a:lstStyle/>
+          <a:p>
+            <a:r>
+              <a:rPr lang="en-US" sz="9600" b="1" dirty="0">
+                <a:ln w="9525">
+                  <a:solidFill>
+                    <a:schemeClr val="bg1"/>
+                  </a:solidFill>
+                  <a:prstDash val="solid"/>
+                </a:ln>
+                <a:effectLst>
+                  <a:outerShdw blurRad="12700" dist="38100" dir="2700000" algn="tl" rotWithShape="0">
+                    <a:schemeClr val="bg1">
+                      <a:lumMod val="50000"/>
+                    </a:schemeClr>
+                  </a:outerShdw>
+                </a:effectLst>
+              </a:rPr>
+              <a:t>DEMO!!!</a:t>
+            </a:r>
+          </a:p>
+        </p:txBody>
+      </p:sp>
+    </p:spTree>
+    <p:extLst>
+      <p:ext uri="{BB962C8B-B14F-4D97-AF65-F5344CB8AC3E}">
+        <p14:creationId xmlns:p14="http://schemas.microsoft.com/office/powerpoint/2010/main" val="1036687008"/>
+      </p:ext>
+    </p:extLst>
+  </p:cSld>
+  <p:clrMapOvr>
+    <a:masterClrMapping/>
+  </p:clrMapOvr>
+</p:sld>
+</file>
+
+<file path=ppt/slides/slide21.xml><?xml version="1.0" encoding="utf-8"?>
+<p:sld xmlns:a="http://schemas.openxmlformats.org/drawingml/2006/main" xmlns:r="http://schemas.openxmlformats.org/officeDocument/2006/relationships" xmlns:p="http://schemas.openxmlformats.org/presentationml/2006/main">
+  <p:cSld>
     <p:bg>
       <p:bgPr>
         <a:blipFill rotWithShape="1">
@@ -16232,7 +16312,7 @@
       </p:sp>
       <p:pic>
         <p:nvPicPr>
-          <p:cNvPr id="3" name="Picture 2" descr="A screenshot of a computer&#10;&#10;Description automatically generated">
+          <p:cNvPr id="3" name="Picture 2">
             <a:extLst>
               <a:ext uri="{FF2B5EF4-FFF2-40B4-BE49-F238E27FC236}">
                 <a16:creationId xmlns:a16="http://schemas.microsoft.com/office/drawing/2014/main" id="{5811B2BA-1626-B2B7-7735-7289E85C9A52}"/>
@@ -16246,14 +16326,13 @@
         </p:nvPicPr>
         <p:blipFill>
           <a:blip r:embed="rId6"/>
-          <a:stretch>
-            <a:fillRect/>
-          </a:stretch>
+          <a:srcRect/>
+          <a:stretch/>
         </p:blipFill>
         <p:spPr>
           <a:xfrm>
-            <a:off x="2359601" y="729484"/>
-            <a:ext cx="4566177" cy="1986287"/>
+            <a:off x="2359601" y="757942"/>
+            <a:ext cx="4566177" cy="1929370"/>
           </a:xfrm>
           <a:prstGeom prst="rect">
             <a:avLst/>

</xml_diff>